<commit_message>
Revised presentation slide presentation and document justifying not using SQL
</commit_message>
<xml_diff>
--- a/Alex/UCI - Project 4 ML - Presentation.pptx
+++ b/Alex/UCI - Project 4 ML - Presentation.pptx
@@ -5,39 +5,40 @@
     <p:sldMasterId id="2147483659" r:id="rId1"/>
   </p:sldMasterIdLst>
   <p:notesMasterIdLst>
-    <p:notesMasterId r:id="rId20"/>
+    <p:notesMasterId r:id="rId21"/>
   </p:notesMasterIdLst>
   <p:sldIdLst>
     <p:sldId id="256" r:id="rId2"/>
     <p:sldId id="257" r:id="rId3"/>
     <p:sldId id="258" r:id="rId4"/>
     <p:sldId id="268" r:id="rId5"/>
-    <p:sldId id="267" r:id="rId6"/>
+    <p:sldId id="276" r:id="rId6"/>
     <p:sldId id="269" r:id="rId7"/>
     <p:sldId id="270" r:id="rId8"/>
-    <p:sldId id="259" r:id="rId9"/>
-    <p:sldId id="260" r:id="rId10"/>
-    <p:sldId id="262" r:id="rId11"/>
-    <p:sldId id="261" r:id="rId12"/>
-    <p:sldId id="271" r:id="rId13"/>
-    <p:sldId id="275" r:id="rId14"/>
-    <p:sldId id="273" r:id="rId15"/>
-    <p:sldId id="274" r:id="rId16"/>
-    <p:sldId id="272" r:id="rId17"/>
-    <p:sldId id="265" r:id="rId18"/>
-    <p:sldId id="266" r:id="rId19"/>
+    <p:sldId id="278" r:id="rId9"/>
+    <p:sldId id="259" r:id="rId10"/>
+    <p:sldId id="260" r:id="rId11"/>
+    <p:sldId id="262" r:id="rId12"/>
+    <p:sldId id="261" r:id="rId13"/>
+    <p:sldId id="271" r:id="rId14"/>
+    <p:sldId id="275" r:id="rId15"/>
+    <p:sldId id="273" r:id="rId16"/>
+    <p:sldId id="274" r:id="rId17"/>
+    <p:sldId id="272" r:id="rId18"/>
+    <p:sldId id="265" r:id="rId19"/>
+    <p:sldId id="266" r:id="rId20"/>
   </p:sldIdLst>
   <p:sldSz cx="9144000" cy="5143500" type="screen16x9"/>
   <p:notesSz cx="6858000" cy="9144000"/>
   <p:embeddedFontLst>
     <p:embeddedFont>
       <p:font typeface="Average" panose="020B0604020202020204" charset="0"/>
-      <p:regular r:id="rId21"/>
+      <p:regular r:id="rId22"/>
     </p:embeddedFont>
     <p:embeddedFont>
       <p:font typeface="Oswald" panose="00000500000000000000" pitchFamily="2" charset="0"/>
-      <p:regular r:id="rId22"/>
-      <p:bold r:id="rId23"/>
+      <p:regular r:id="rId23"/>
+      <p:bold r:id="rId24"/>
     </p:embeddedFont>
   </p:embeddedFontLst>
   <p:defaultTextStyle>
@@ -5873,6 +5874,777 @@
   <p:cSld>
     <p:spTree>
       <p:nvGrpSpPr>
+        <p:cNvPr id="1" name="Shape 82"/>
+        <p:cNvGrpSpPr/>
+        <p:nvPr/>
+      </p:nvGrpSpPr>
+      <p:grpSpPr>
+        <a:xfrm>
+          <a:off x="0" y="0"/>
+          <a:ext cx="0" cy="0"/>
+          <a:chOff x="0" y="0"/>
+          <a:chExt cx="0" cy="0"/>
+        </a:xfrm>
+      </p:grpSpPr>
+      <p:sp>
+        <p:nvSpPr>
+          <p:cNvPr id="83" name="Google Shape;83;p17"/>
+          <p:cNvSpPr txBox="1">
+            <a:spLocks noGrp="1"/>
+          </p:cNvSpPr>
+          <p:nvPr>
+            <p:ph type="title"/>
+          </p:nvPr>
+        </p:nvSpPr>
+        <p:spPr>
+          <a:xfrm>
+            <a:off x="265974" y="193575"/>
+            <a:ext cx="3868703" cy="572700"/>
+          </a:xfrm>
+          <a:prstGeom prst="rect">
+            <a:avLst/>
+          </a:prstGeom>
+        </p:spPr>
+        <p:txBody>
+          <a:bodyPr spcFirstLastPara="1" wrap="square" lIns="91425" tIns="91425" rIns="91425" bIns="91425" anchor="t" anchorCtr="0">
+            <a:noAutofit/>
+          </a:bodyPr>
+          <a:lstStyle/>
+          <a:p>
+            <a:pPr marL="0" lvl="0" indent="0" algn="l" rtl="0">
+              <a:spcBef>
+                <a:spcPts val="0"/>
+              </a:spcBef>
+              <a:spcAft>
+                <a:spcPts val="0"/>
+              </a:spcAft>
+              <a:buNone/>
+            </a:pPr>
+            <a:r>
+              <a:rPr lang="en" sz="2600" dirty="0"/>
+              <a:t>Random Forest </a:t>
+            </a:r>
+            <a:r>
+              <a:rPr lang="en-US" sz="2600" dirty="0"/>
+              <a:t>(Version 10): </a:t>
+            </a:r>
+            <a:r>
+              <a:rPr lang="en" sz="2600" dirty="0"/>
+              <a:t>  </a:t>
+            </a:r>
+            <a:endParaRPr sz="2600" dirty="0"/>
+          </a:p>
+        </p:txBody>
+      </p:sp>
+      <p:sp>
+        <p:nvSpPr>
+          <p:cNvPr id="84" name="Google Shape;84;p17"/>
+          <p:cNvSpPr/>
+          <p:nvPr/>
+        </p:nvSpPr>
+        <p:spPr>
+          <a:xfrm>
+            <a:off x="139325" y="159825"/>
+            <a:ext cx="3723684" cy="640200"/>
+          </a:xfrm>
+          <a:prstGeom prst="rect">
+            <a:avLst/>
+          </a:prstGeom>
+          <a:noFill/>
+          <a:ln w="9525" cap="flat" cmpd="sng">
+            <a:solidFill>
+              <a:schemeClr val="dk2"/>
+            </a:solidFill>
+            <a:prstDash val="solid"/>
+            <a:round/>
+            <a:headEnd type="none" w="sm" len="sm"/>
+            <a:tailEnd type="none" w="sm" len="sm"/>
+          </a:ln>
+        </p:spPr>
+        <p:txBody>
+          <a:bodyPr spcFirstLastPara="1" wrap="square" lIns="91425" tIns="91425" rIns="91425" bIns="91425" anchor="ctr" anchorCtr="0">
+            <a:noAutofit/>
+          </a:bodyPr>
+          <a:lstStyle/>
+          <a:p>
+            <a:pPr marL="0" lvl="0" indent="0" algn="ctr" rtl="0">
+              <a:spcBef>
+                <a:spcPts val="0"/>
+              </a:spcBef>
+              <a:spcAft>
+                <a:spcPts val="0"/>
+              </a:spcAft>
+              <a:buNone/>
+            </a:pPr>
+            <a:endParaRPr>
+              <a:latin typeface="Average"/>
+              <a:ea typeface="Average"/>
+              <a:cs typeface="Average"/>
+              <a:sym typeface="Average"/>
+            </a:endParaRPr>
+          </a:p>
+        </p:txBody>
+      </p:sp>
+      <p:sp>
+        <p:nvSpPr>
+          <p:cNvPr id="2" name="Google Shape;72;p15">
+            <a:extLst>
+              <a:ext uri="{FF2B5EF4-FFF2-40B4-BE49-F238E27FC236}">
+                <a16:creationId xmlns:a16="http://schemas.microsoft.com/office/drawing/2014/main" id="{0348BC04-2120-1BBF-2675-25C9BC032DD6}"/>
+              </a:ext>
+            </a:extLst>
+          </p:cNvPr>
+          <p:cNvSpPr txBox="1">
+            <a:spLocks/>
+          </p:cNvSpPr>
+          <p:nvPr/>
+        </p:nvSpPr>
+        <p:spPr>
+          <a:xfrm>
+            <a:off x="311700" y="1152474"/>
+            <a:ext cx="8520600" cy="3889977"/>
+          </a:xfrm>
+          <a:prstGeom prst="rect">
+            <a:avLst/>
+          </a:prstGeom>
+        </p:spPr>
+        <p:txBody>
+          <a:bodyPr spcFirstLastPara="1" wrap="square" lIns="91425" tIns="91425" rIns="91425" bIns="91425" anchor="t" anchorCtr="0">
+            <a:noAutofit/>
+          </a:bodyPr>
+          <a:lstStyle>
+            <a:defPPr marR="0" lvl="0" algn="l" rtl="0">
+              <a:lnSpc>
+                <a:spcPct val="100000"/>
+              </a:lnSpc>
+              <a:spcBef>
+                <a:spcPts val="0"/>
+              </a:spcBef>
+              <a:spcAft>
+                <a:spcPts val="0"/>
+              </a:spcAft>
+            </a:defPPr>
+            <a:lvl1pPr marR="0" lvl="0" algn="l" rtl="0">
+              <a:lnSpc>
+                <a:spcPct val="100000"/>
+              </a:lnSpc>
+              <a:spcBef>
+                <a:spcPts val="0"/>
+              </a:spcBef>
+              <a:spcAft>
+                <a:spcPts val="0"/>
+              </a:spcAft>
+              <a:buClr>
+                <a:srgbClr val="000000"/>
+              </a:buClr>
+              <a:buFont typeface="Arial"/>
+              <a:defRPr sz="1400" b="0" i="0" u="none" strike="noStrike" cap="none">
+                <a:solidFill>
+                  <a:srgbClr val="000000"/>
+                </a:solidFill>
+                <a:latin typeface="Arial"/>
+                <a:ea typeface="Arial"/>
+                <a:cs typeface="Arial"/>
+                <a:sym typeface="Arial"/>
+              </a:defRPr>
+            </a:lvl1pPr>
+            <a:lvl2pPr marR="0" lvl="1" algn="l" rtl="0">
+              <a:lnSpc>
+                <a:spcPct val="100000"/>
+              </a:lnSpc>
+              <a:spcBef>
+                <a:spcPts val="0"/>
+              </a:spcBef>
+              <a:spcAft>
+                <a:spcPts val="0"/>
+              </a:spcAft>
+              <a:buClr>
+                <a:srgbClr val="000000"/>
+              </a:buClr>
+              <a:buFont typeface="Arial"/>
+              <a:defRPr sz="1400" b="0" i="0" u="none" strike="noStrike" cap="none">
+                <a:solidFill>
+                  <a:srgbClr val="000000"/>
+                </a:solidFill>
+                <a:latin typeface="Arial"/>
+                <a:ea typeface="Arial"/>
+                <a:cs typeface="Arial"/>
+                <a:sym typeface="Arial"/>
+              </a:defRPr>
+            </a:lvl2pPr>
+            <a:lvl3pPr marR="0" lvl="2" algn="l" rtl="0">
+              <a:lnSpc>
+                <a:spcPct val="100000"/>
+              </a:lnSpc>
+              <a:spcBef>
+                <a:spcPts val="0"/>
+              </a:spcBef>
+              <a:spcAft>
+                <a:spcPts val="0"/>
+              </a:spcAft>
+              <a:buClr>
+                <a:srgbClr val="000000"/>
+              </a:buClr>
+              <a:buFont typeface="Arial"/>
+              <a:defRPr sz="1400" b="0" i="0" u="none" strike="noStrike" cap="none">
+                <a:solidFill>
+                  <a:srgbClr val="000000"/>
+                </a:solidFill>
+                <a:latin typeface="Arial"/>
+                <a:ea typeface="Arial"/>
+                <a:cs typeface="Arial"/>
+                <a:sym typeface="Arial"/>
+              </a:defRPr>
+            </a:lvl3pPr>
+            <a:lvl4pPr marR="0" lvl="3" algn="l" rtl="0">
+              <a:lnSpc>
+                <a:spcPct val="100000"/>
+              </a:lnSpc>
+              <a:spcBef>
+                <a:spcPts val="0"/>
+              </a:spcBef>
+              <a:spcAft>
+                <a:spcPts val="0"/>
+              </a:spcAft>
+              <a:buClr>
+                <a:srgbClr val="000000"/>
+              </a:buClr>
+              <a:buFont typeface="Arial"/>
+              <a:defRPr sz="1400" b="0" i="0" u="none" strike="noStrike" cap="none">
+                <a:solidFill>
+                  <a:srgbClr val="000000"/>
+                </a:solidFill>
+                <a:latin typeface="Arial"/>
+                <a:ea typeface="Arial"/>
+                <a:cs typeface="Arial"/>
+                <a:sym typeface="Arial"/>
+              </a:defRPr>
+            </a:lvl4pPr>
+            <a:lvl5pPr marR="0" lvl="4" algn="l" rtl="0">
+              <a:lnSpc>
+                <a:spcPct val="100000"/>
+              </a:lnSpc>
+              <a:spcBef>
+                <a:spcPts val="0"/>
+              </a:spcBef>
+              <a:spcAft>
+                <a:spcPts val="0"/>
+              </a:spcAft>
+              <a:buClr>
+                <a:srgbClr val="000000"/>
+              </a:buClr>
+              <a:buFont typeface="Arial"/>
+              <a:defRPr sz="1400" b="0" i="0" u="none" strike="noStrike" cap="none">
+                <a:solidFill>
+                  <a:srgbClr val="000000"/>
+                </a:solidFill>
+                <a:latin typeface="Arial"/>
+                <a:ea typeface="Arial"/>
+                <a:cs typeface="Arial"/>
+                <a:sym typeface="Arial"/>
+              </a:defRPr>
+            </a:lvl5pPr>
+            <a:lvl6pPr marR="0" lvl="5" algn="l" rtl="0">
+              <a:lnSpc>
+                <a:spcPct val="100000"/>
+              </a:lnSpc>
+              <a:spcBef>
+                <a:spcPts val="0"/>
+              </a:spcBef>
+              <a:spcAft>
+                <a:spcPts val="0"/>
+              </a:spcAft>
+              <a:buClr>
+                <a:srgbClr val="000000"/>
+              </a:buClr>
+              <a:buFont typeface="Arial"/>
+              <a:defRPr sz="1400" b="0" i="0" u="none" strike="noStrike" cap="none">
+                <a:solidFill>
+                  <a:srgbClr val="000000"/>
+                </a:solidFill>
+                <a:latin typeface="Arial"/>
+                <a:ea typeface="Arial"/>
+                <a:cs typeface="Arial"/>
+                <a:sym typeface="Arial"/>
+              </a:defRPr>
+            </a:lvl6pPr>
+            <a:lvl7pPr marR="0" lvl="6" algn="l" rtl="0">
+              <a:lnSpc>
+                <a:spcPct val="100000"/>
+              </a:lnSpc>
+              <a:spcBef>
+                <a:spcPts val="0"/>
+              </a:spcBef>
+              <a:spcAft>
+                <a:spcPts val="0"/>
+              </a:spcAft>
+              <a:buClr>
+                <a:srgbClr val="000000"/>
+              </a:buClr>
+              <a:buFont typeface="Arial"/>
+              <a:defRPr sz="1400" b="0" i="0" u="none" strike="noStrike" cap="none">
+                <a:solidFill>
+                  <a:srgbClr val="000000"/>
+                </a:solidFill>
+                <a:latin typeface="Arial"/>
+                <a:ea typeface="Arial"/>
+                <a:cs typeface="Arial"/>
+                <a:sym typeface="Arial"/>
+              </a:defRPr>
+            </a:lvl7pPr>
+            <a:lvl8pPr marR="0" lvl="7" algn="l" rtl="0">
+              <a:lnSpc>
+                <a:spcPct val="100000"/>
+              </a:lnSpc>
+              <a:spcBef>
+                <a:spcPts val="0"/>
+              </a:spcBef>
+              <a:spcAft>
+                <a:spcPts val="0"/>
+              </a:spcAft>
+              <a:buClr>
+                <a:srgbClr val="000000"/>
+              </a:buClr>
+              <a:buFont typeface="Arial"/>
+              <a:defRPr sz="1400" b="0" i="0" u="none" strike="noStrike" cap="none">
+                <a:solidFill>
+                  <a:srgbClr val="000000"/>
+                </a:solidFill>
+                <a:latin typeface="Arial"/>
+                <a:ea typeface="Arial"/>
+                <a:cs typeface="Arial"/>
+                <a:sym typeface="Arial"/>
+              </a:defRPr>
+            </a:lvl8pPr>
+            <a:lvl9pPr marR="0" lvl="8" algn="l" rtl="0">
+              <a:lnSpc>
+                <a:spcPct val="100000"/>
+              </a:lnSpc>
+              <a:spcBef>
+                <a:spcPts val="0"/>
+              </a:spcBef>
+              <a:spcAft>
+                <a:spcPts val="0"/>
+              </a:spcAft>
+              <a:buClr>
+                <a:srgbClr val="000000"/>
+              </a:buClr>
+              <a:buFont typeface="Arial"/>
+              <a:defRPr sz="1400" b="0" i="0" u="none" strike="noStrike" cap="none">
+                <a:solidFill>
+                  <a:srgbClr val="000000"/>
+                </a:solidFill>
+                <a:latin typeface="Arial"/>
+                <a:ea typeface="Arial"/>
+                <a:cs typeface="Arial"/>
+                <a:sym typeface="Arial"/>
+              </a:defRPr>
+            </a:lvl9pPr>
+          </a:lstStyle>
+          <a:p>
+            <a:pPr>
+              <a:lnSpc>
+                <a:spcPct val="95000"/>
+              </a:lnSpc>
+              <a:buClr>
+                <a:schemeClr val="accent3"/>
+              </a:buClr>
+              <a:buSzPts val="1800"/>
+            </a:pPr>
+            <a:r>
+              <a:rPr lang="en-US" sz="1200" dirty="0">
+                <a:solidFill>
+                  <a:schemeClr val="accent3"/>
+                </a:solidFill>
+                <a:latin typeface="Average"/>
+                <a:sym typeface="Oswald"/>
+              </a:rPr>
+              <a:t>The Random Forest model was introduced to capture non-linearities. Optimization using </a:t>
+            </a:r>
+            <a:r>
+              <a:rPr lang="en-US" sz="1200" dirty="0" err="1">
+                <a:solidFill>
+                  <a:schemeClr val="accent3"/>
+                </a:solidFill>
+                <a:latin typeface="Average"/>
+                <a:sym typeface="Oswald"/>
+              </a:rPr>
+              <a:t>RandomizedSearchCV</a:t>
+            </a:r>
+            <a:r>
+              <a:rPr lang="en-US" sz="1200" dirty="0">
+                <a:solidFill>
+                  <a:schemeClr val="accent3"/>
+                </a:solidFill>
+                <a:latin typeface="Average"/>
+                <a:sym typeface="Oswald"/>
+              </a:rPr>
+              <a:t> (balancing thoroughness and efficiency) provided improved performance over the baseline Logistic Regression (AUC-ROC ~0.803), demonstrating the value of tree-based ensembles.</a:t>
+            </a:r>
+          </a:p>
+          <a:p>
+            <a:pPr>
+              <a:lnSpc>
+                <a:spcPct val="95000"/>
+              </a:lnSpc>
+              <a:buClr>
+                <a:schemeClr val="accent3"/>
+              </a:buClr>
+              <a:buSzPts val="1800"/>
+            </a:pPr>
+            <a:endParaRPr lang="en-US" sz="1200" dirty="0">
+              <a:solidFill>
+                <a:schemeClr val="accent3"/>
+              </a:solidFill>
+              <a:latin typeface="Average"/>
+              <a:sym typeface="Oswald"/>
+            </a:endParaRPr>
+          </a:p>
+          <a:p>
+            <a:pPr>
+              <a:lnSpc>
+                <a:spcPct val="95000"/>
+              </a:lnSpc>
+              <a:buClr>
+                <a:schemeClr val="accent3"/>
+              </a:buClr>
+              <a:buSzPts val="1800"/>
+            </a:pPr>
+            <a:r>
+              <a:rPr lang="en-US" sz="1200" dirty="0">
+                <a:solidFill>
+                  <a:schemeClr val="accent3"/>
+                </a:solidFill>
+                <a:latin typeface="Average"/>
+                <a:sym typeface="Oswald"/>
+              </a:rPr>
+              <a:t>Efficient Random Forest Optimization: The core change is using </a:t>
+            </a:r>
+            <a:r>
+              <a:rPr lang="en-US" sz="1200" dirty="0" err="1">
+                <a:solidFill>
+                  <a:schemeClr val="accent3"/>
+                </a:solidFill>
+                <a:latin typeface="Average"/>
+                <a:sym typeface="Oswald"/>
+              </a:rPr>
+              <a:t>RandomizedSearchCV</a:t>
+            </a:r>
+            <a:r>
+              <a:rPr lang="en-US" sz="1200" dirty="0">
+                <a:solidFill>
+                  <a:schemeClr val="accent3"/>
+                </a:solidFill>
+                <a:latin typeface="Average"/>
+                <a:sym typeface="Oswald"/>
+              </a:rPr>
+              <a:t> instead of </a:t>
+            </a:r>
+            <a:r>
+              <a:rPr lang="en-US" sz="1200" dirty="0" err="1">
+                <a:solidFill>
+                  <a:schemeClr val="accent3"/>
+                </a:solidFill>
+                <a:latin typeface="Average"/>
+                <a:sym typeface="Oswald"/>
+              </a:rPr>
+              <a:t>GridSearchCV</a:t>
+            </a:r>
+            <a:r>
+              <a:rPr lang="en-US" sz="1200" dirty="0">
+                <a:solidFill>
+                  <a:schemeClr val="accent3"/>
+                </a:solidFill>
+                <a:latin typeface="Average"/>
+                <a:sym typeface="Oswald"/>
+              </a:rPr>
+              <a:t> for the Random Forest.  Instead of trying every combination of hyperparameters (like </a:t>
+            </a:r>
+            <a:r>
+              <a:rPr lang="en-US" sz="1200" dirty="0" err="1">
+                <a:solidFill>
+                  <a:schemeClr val="accent3"/>
+                </a:solidFill>
+                <a:latin typeface="Average"/>
+                <a:sym typeface="Oswald"/>
+              </a:rPr>
+              <a:t>GridSearchCV</a:t>
+            </a:r>
+            <a:r>
+              <a:rPr lang="en-US" sz="1200" dirty="0">
+                <a:solidFill>
+                  <a:schemeClr val="accent3"/>
+                </a:solidFill>
+                <a:latin typeface="Average"/>
+                <a:sym typeface="Oswald"/>
+              </a:rPr>
+              <a:t>), </a:t>
+            </a:r>
+            <a:r>
+              <a:rPr lang="en-US" sz="1200" dirty="0" err="1">
+                <a:solidFill>
+                  <a:schemeClr val="accent3"/>
+                </a:solidFill>
+                <a:latin typeface="Average"/>
+                <a:sym typeface="Oswald"/>
+              </a:rPr>
+              <a:t>RandomizedSearchCV</a:t>
+            </a:r>
+            <a:r>
+              <a:rPr lang="en-US" sz="1200" dirty="0">
+                <a:solidFill>
+                  <a:schemeClr val="accent3"/>
+                </a:solidFill>
+                <a:latin typeface="Average"/>
+                <a:sym typeface="Oswald"/>
+              </a:rPr>
+              <a:t> samples a specified number of combinations (</a:t>
+            </a:r>
+            <a:r>
+              <a:rPr lang="en-US" sz="1200" dirty="0" err="1">
+                <a:solidFill>
+                  <a:schemeClr val="accent3"/>
+                </a:solidFill>
+                <a:latin typeface="Average"/>
+                <a:sym typeface="Oswald"/>
+              </a:rPr>
+              <a:t>n_iter</a:t>
+            </a:r>
+            <a:r>
+              <a:rPr lang="en-US" sz="1200" dirty="0">
+                <a:solidFill>
+                  <a:schemeClr val="accent3"/>
+                </a:solidFill>
+                <a:latin typeface="Average"/>
+                <a:sym typeface="Oswald"/>
+              </a:rPr>
+              <a:t>) randomly from the provided distributions. This is much faster, especially with large search spaces.</a:t>
+            </a:r>
+          </a:p>
+          <a:p>
+            <a:pPr>
+              <a:lnSpc>
+                <a:spcPct val="95000"/>
+              </a:lnSpc>
+              <a:buClr>
+                <a:schemeClr val="accent3"/>
+              </a:buClr>
+              <a:buSzPts val="1800"/>
+            </a:pPr>
+            <a:endParaRPr lang="en-US" sz="1200" dirty="0">
+              <a:solidFill>
+                <a:schemeClr val="accent3"/>
+              </a:solidFill>
+              <a:latin typeface="Average"/>
+              <a:sym typeface="Oswald"/>
+            </a:endParaRPr>
+          </a:p>
+          <a:p>
+            <a:pPr marL="171450" lvl="5" indent="-171450">
+              <a:lnSpc>
+                <a:spcPct val="95000"/>
+              </a:lnSpc>
+              <a:buClr>
+                <a:schemeClr val="accent3"/>
+              </a:buClr>
+              <a:buSzPts val="1800"/>
+              <a:buFont typeface="Arial"/>
+              <a:buChar char="●"/>
+            </a:pPr>
+            <a:r>
+              <a:rPr lang="en-US" sz="1200" dirty="0">
+                <a:solidFill>
+                  <a:schemeClr val="accent3"/>
+                </a:solidFill>
+                <a:latin typeface="Average"/>
+                <a:sym typeface="Oswald"/>
+              </a:rPr>
+              <a:t>Balanced </a:t>
+            </a:r>
+            <a:r>
+              <a:rPr lang="en-US" sz="1200" dirty="0" err="1">
+                <a:solidFill>
+                  <a:schemeClr val="accent3"/>
+                </a:solidFill>
+                <a:latin typeface="Average"/>
+                <a:sym typeface="Oswald"/>
+              </a:rPr>
+              <a:t>n_iter</a:t>
+            </a:r>
+            <a:r>
+              <a:rPr lang="en-US" sz="1200" dirty="0">
+                <a:solidFill>
+                  <a:schemeClr val="accent3"/>
+                </a:solidFill>
+                <a:latin typeface="Average"/>
+                <a:sym typeface="Oswald"/>
+              </a:rPr>
+              <a:t>: The </a:t>
+            </a:r>
+            <a:r>
+              <a:rPr lang="en-US" sz="1200" dirty="0" err="1">
+                <a:solidFill>
+                  <a:schemeClr val="accent3"/>
+                </a:solidFill>
+                <a:latin typeface="Average"/>
+                <a:sym typeface="Oswald"/>
+              </a:rPr>
+              <a:t>n_iter</a:t>
+            </a:r>
+            <a:r>
+              <a:rPr lang="en-US" sz="1200" dirty="0">
+                <a:solidFill>
+                  <a:schemeClr val="accent3"/>
+                </a:solidFill>
+                <a:latin typeface="Average"/>
+                <a:sym typeface="Oswald"/>
+              </a:rPr>
+              <a:t> parameter is the primary control over the trade-off between search thoroughness and computation time. 20 iterations is a good starting point; you can adjust it based on your available time and the specific problem.</a:t>
+            </a:r>
+          </a:p>
+          <a:p>
+            <a:pPr marL="171450" lvl="5" indent="-171450">
+              <a:lnSpc>
+                <a:spcPct val="95000"/>
+              </a:lnSpc>
+              <a:buClr>
+                <a:schemeClr val="accent3"/>
+              </a:buClr>
+              <a:buSzPts val="1800"/>
+              <a:buFont typeface="Arial"/>
+              <a:buChar char="●"/>
+            </a:pPr>
+            <a:endParaRPr lang="en-US" sz="1200" dirty="0">
+              <a:solidFill>
+                <a:schemeClr val="accent3"/>
+              </a:solidFill>
+              <a:latin typeface="Average"/>
+              <a:sym typeface="Oswald"/>
+            </a:endParaRPr>
+          </a:p>
+          <a:p>
+            <a:pPr marL="171450" lvl="4" indent="-171450">
+              <a:lnSpc>
+                <a:spcPct val="95000"/>
+              </a:lnSpc>
+              <a:buClr>
+                <a:schemeClr val="accent3"/>
+              </a:buClr>
+              <a:buSzPts val="1800"/>
+              <a:buFont typeface="Arial"/>
+              <a:buChar char="●"/>
+            </a:pPr>
+            <a:r>
+              <a:rPr lang="en-US" sz="1200" dirty="0">
+                <a:solidFill>
+                  <a:schemeClr val="accent3"/>
+                </a:solidFill>
+                <a:latin typeface="Average"/>
+                <a:sym typeface="Oswald"/>
+              </a:rPr>
+              <a:t>Strategic Parameter Grid: Even with randomized search, a well-chosen </a:t>
+            </a:r>
+            <a:r>
+              <a:rPr lang="en-US" sz="1200" dirty="0" err="1">
+                <a:solidFill>
+                  <a:schemeClr val="accent3"/>
+                </a:solidFill>
+                <a:latin typeface="Average"/>
+                <a:sym typeface="Oswald"/>
+              </a:rPr>
+              <a:t>param_grid_rf</a:t>
+            </a:r>
+            <a:r>
+              <a:rPr lang="en-US" sz="1200" dirty="0">
+                <a:solidFill>
+                  <a:schemeClr val="accent3"/>
+                </a:solidFill>
+                <a:latin typeface="Average"/>
+                <a:sym typeface="Oswald"/>
+              </a:rPr>
+              <a:t> is important. The ranges provided cover the most important hyperparameters and typical values that work well.</a:t>
+            </a:r>
+          </a:p>
+          <a:p>
+            <a:pPr marL="171450" lvl="4" indent="-171450">
+              <a:lnSpc>
+                <a:spcPct val="95000"/>
+              </a:lnSpc>
+              <a:buClr>
+                <a:schemeClr val="accent3"/>
+              </a:buClr>
+              <a:buSzPts val="1800"/>
+              <a:buFont typeface="Arial"/>
+              <a:buChar char="●"/>
+            </a:pPr>
+            <a:endParaRPr lang="en-US" sz="1200" dirty="0">
+              <a:solidFill>
+                <a:schemeClr val="accent3"/>
+              </a:solidFill>
+              <a:latin typeface="Average"/>
+              <a:sym typeface="Oswald"/>
+            </a:endParaRPr>
+          </a:p>
+          <a:p>
+            <a:pPr marL="171450" lvl="4" indent="-171450">
+              <a:lnSpc>
+                <a:spcPct val="95000"/>
+              </a:lnSpc>
+              <a:buClr>
+                <a:schemeClr val="accent3"/>
+              </a:buClr>
+              <a:buSzPts val="1800"/>
+              <a:buFont typeface="Arial"/>
+              <a:buChar char="●"/>
+            </a:pPr>
+            <a:r>
+              <a:rPr lang="en-US" sz="1200" dirty="0">
+                <a:solidFill>
+                  <a:schemeClr val="accent3"/>
+                </a:solidFill>
+                <a:latin typeface="Average"/>
+                <a:sym typeface="Oswald"/>
+              </a:rPr>
+              <a:t>Reduced CV Folds: Using cv=5 for the Random Forest further speeds up the process without sacrificing too much accuracy in the performance estimate.</a:t>
+            </a:r>
+          </a:p>
+          <a:p>
+            <a:endParaRPr lang="en-US" sz="1200" dirty="0">
+              <a:solidFill>
+                <a:schemeClr val="dk1"/>
+              </a:solidFill>
+              <a:latin typeface="Oswald"/>
+              <a:ea typeface="Oswald"/>
+              <a:cs typeface="Oswald"/>
+              <a:sym typeface="Oswald"/>
+            </a:endParaRPr>
+          </a:p>
+          <a:p>
+            <a:endParaRPr lang="en-US" sz="1200" dirty="0">
+              <a:solidFill>
+                <a:schemeClr val="dk1"/>
+              </a:solidFill>
+              <a:latin typeface="Oswald"/>
+              <a:ea typeface="Oswald"/>
+              <a:cs typeface="Oswald"/>
+              <a:sym typeface="Oswald"/>
+            </a:endParaRPr>
+          </a:p>
+        </p:txBody>
+      </p:sp>
+    </p:spTree>
+  </p:cSld>
+  <p:clrMapOvr>
+    <a:masterClrMapping/>
+  </p:clrMapOvr>
+</p:sld>
+</file>
+
+<file path=ppt/slides/slide11.xml><?xml version="1.0" encoding="utf-8"?>
+<p:sld xmlns:a="http://schemas.openxmlformats.org/drawingml/2006/main" xmlns:r="http://schemas.openxmlformats.org/officeDocument/2006/relationships" xmlns:p="http://schemas.openxmlformats.org/presentationml/2006/main">
+  <p:cSld>
+    <p:spTree>
+      <p:nvGrpSpPr>
         <p:cNvPr id="1" name="Shape 94"/>
         <p:cNvGrpSpPr/>
         <p:nvPr/>
@@ -6236,7 +7008,7 @@
 </p:sld>
 </file>
 
-<file path=ppt/slides/slide11.xml><?xml version="1.0" encoding="utf-8"?>
+<file path=ppt/slides/slide12.xml><?xml version="1.0" encoding="utf-8"?>
 <p:sld xmlns:a="http://schemas.openxmlformats.org/drawingml/2006/main" xmlns:r="http://schemas.openxmlformats.org/officeDocument/2006/relationships" xmlns:p="http://schemas.openxmlformats.org/presentationml/2006/main">
   <p:cSld>
     <p:spTree>
@@ -7228,7 +8000,7 @@
 </p:sld>
 </file>
 
-<file path=ppt/slides/slide12.xml><?xml version="1.0" encoding="utf-8"?>
+<file path=ppt/slides/slide13.xml><?xml version="1.0" encoding="utf-8"?>
 <p:sld xmlns:a="http://schemas.openxmlformats.org/drawingml/2006/main" xmlns:r="http://schemas.openxmlformats.org/officeDocument/2006/relationships" xmlns:p="http://schemas.openxmlformats.org/presentationml/2006/main">
   <p:cSld>
     <p:spTree>
@@ -7288,7 +8060,7 @@
 </p:sld>
 </file>
 
-<file path=ppt/slides/slide13.xml><?xml version="1.0" encoding="utf-8"?>
+<file path=ppt/slides/slide14.xml><?xml version="1.0" encoding="utf-8"?>
 <p:sld xmlns:a="http://schemas.openxmlformats.org/drawingml/2006/main" xmlns:r="http://schemas.openxmlformats.org/officeDocument/2006/relationships" xmlns:p="http://schemas.openxmlformats.org/presentationml/2006/main">
   <p:cSld>
     <p:spTree>
@@ -7348,7 +8120,7 @@
 </p:sld>
 </file>
 
-<file path=ppt/slides/slide14.xml><?xml version="1.0" encoding="utf-8"?>
+<file path=ppt/slides/slide15.xml><?xml version="1.0" encoding="utf-8"?>
 <p:sld xmlns:a="http://schemas.openxmlformats.org/drawingml/2006/main" xmlns:r="http://schemas.openxmlformats.org/officeDocument/2006/relationships" xmlns:p="http://schemas.openxmlformats.org/presentationml/2006/main">
   <p:cSld>
     <p:spTree>
@@ -7408,7 +8180,7 @@
 </p:sld>
 </file>
 
-<file path=ppt/slides/slide15.xml><?xml version="1.0" encoding="utf-8"?>
+<file path=ppt/slides/slide16.xml><?xml version="1.0" encoding="utf-8"?>
 <p:sld xmlns:a="http://schemas.openxmlformats.org/drawingml/2006/main" xmlns:r="http://schemas.openxmlformats.org/officeDocument/2006/relationships" xmlns:p="http://schemas.openxmlformats.org/presentationml/2006/main">
   <p:cSld>
     <p:spTree>
@@ -7498,7 +8270,7 @@
 </p:sld>
 </file>
 
-<file path=ppt/slides/slide16.xml><?xml version="1.0" encoding="utf-8"?>
+<file path=ppt/slides/slide17.xml><?xml version="1.0" encoding="utf-8"?>
 <p:sld xmlns:a="http://schemas.openxmlformats.org/drawingml/2006/main" xmlns:r="http://schemas.openxmlformats.org/officeDocument/2006/relationships" xmlns:p="http://schemas.openxmlformats.org/presentationml/2006/main">
   <p:cSld>
     <p:spTree>
@@ -7558,7 +8330,7 @@
 </p:sld>
 </file>
 
-<file path=ppt/slides/slide17.xml><?xml version="1.0" encoding="utf-8"?>
+<file path=ppt/slides/slide18.xml><?xml version="1.0" encoding="utf-8"?>
 <p:sld xmlns:a="http://schemas.openxmlformats.org/drawingml/2006/main" xmlns:r="http://schemas.openxmlformats.org/officeDocument/2006/relationships" xmlns:p="http://schemas.openxmlformats.org/presentationml/2006/main">
   <p:cSld>
     <p:spTree>
@@ -9021,7 +9793,7 @@
 </p:sld>
 </file>
 
-<file path=ppt/slides/slide18.xml><?xml version="1.0" encoding="utf-8"?>
+<file path=ppt/slides/slide19.xml><?xml version="1.0" encoding="utf-8"?>
 <p:sld xmlns:a="http://schemas.openxmlformats.org/drawingml/2006/main" xmlns:r="http://schemas.openxmlformats.org/officeDocument/2006/relationships" xmlns:p="http://schemas.openxmlformats.org/presentationml/2006/main">
   <p:cSld>
     <p:spTree>
@@ -9603,7 +10375,13 @@
   <p:cSld>
     <p:spTree>
       <p:nvGrpSpPr>
-        <p:cNvPr id="1" name=""/>
+        <p:cNvPr id="1" name="">
+          <a:extLst>
+            <a:ext uri="{FF2B5EF4-FFF2-40B4-BE49-F238E27FC236}">
+              <a16:creationId xmlns:a16="http://schemas.microsoft.com/office/drawing/2014/main" id="{C087C943-AF96-0C53-1B6A-B0BA2DA57F78}"/>
+            </a:ext>
+          </a:extLst>
+        </p:cNvPr>
         <p:cNvGrpSpPr/>
         <p:nvPr/>
       </p:nvGrpSpPr>
@@ -9620,7 +10398,7 @@
           <p:cNvPr id="2" name="Title 1">
             <a:extLst>
               <a:ext uri="{FF2B5EF4-FFF2-40B4-BE49-F238E27FC236}">
-                <a16:creationId xmlns:a16="http://schemas.microsoft.com/office/drawing/2014/main" id="{B53B94AC-A3A6-CCBF-8CAA-BC31978A23F5}"/>
+                <a16:creationId xmlns:a16="http://schemas.microsoft.com/office/drawing/2014/main" id="{AEFDB008-E88B-6D6F-06D3-7C43EEF5E9BF}"/>
               </a:ext>
             </a:extLst>
           </p:cNvPr>
@@ -9648,7 +10426,7 @@
           <p:cNvPr id="3" name="Text Placeholder 2">
             <a:extLst>
               <a:ext uri="{FF2B5EF4-FFF2-40B4-BE49-F238E27FC236}">
-                <a16:creationId xmlns:a16="http://schemas.microsoft.com/office/drawing/2014/main" id="{43AEE4C1-3BAE-A578-E17C-9EE3B09090C4}"/>
+                <a16:creationId xmlns:a16="http://schemas.microsoft.com/office/drawing/2014/main" id="{E58A5031-642B-E202-0EC6-95D3C7428C96}"/>
               </a:ext>
             </a:extLst>
           </p:cNvPr>
@@ -9667,7 +10445,7 @@
         </p:spPr>
         <p:txBody>
           <a:bodyPr tIns="91440">
-            <a:normAutofit lnSpcReduction="10000"/>
+            <a:normAutofit fontScale="70000" lnSpcReduction="20000"/>
           </a:bodyPr>
           <a:lstStyle/>
           <a:p>
@@ -9677,8 +10455,8 @@
               </a:lnSpc>
             </a:pPr>
             <a:r>
-              <a:rPr lang="en-US" sz="1200" b="1" dirty="0"/>
-              <a:t>Outlier Management (Focus: Data Preservation):</a:t>
+              <a:rPr lang="en-US" sz="1300" b="1" dirty="0"/>
+              <a:t>Outlier Management (Focus: Data Preservation; Version 1):</a:t>
             </a:r>
           </a:p>
           <a:p>
@@ -9700,7 +10478,7 @@
             </a:pPr>
             <a:r>
               <a:rPr lang="en-US" sz="1300" dirty="0"/>
-              <a:t>Implemented K-Nearest Neighbors (KNN) Imputation (Version 1) to address outliers in numerical features (like BMI, Age).</a:t>
+              <a:t>Selected K-Nearest Neighbors (KNN) Imputation: Replace outliers with values based on the average of the nearest neighbors of the outlier data to address outliers in numerical features (like BMI, Age).</a:t>
             </a:r>
           </a:p>
           <a:p>
@@ -9734,7 +10512,7 @@
               <a:buFont typeface="Average"/>
               <a:buNone/>
             </a:pPr>
-            <a:endParaRPr lang="en-US" sz="1200" dirty="0">
+            <a:endParaRPr lang="en-US" sz="1300" dirty="0">
               <a:solidFill>
                 <a:schemeClr val="dk1"/>
               </a:solidFill>
@@ -9748,7 +10526,130 @@
               </a:lnSpc>
             </a:pPr>
             <a:r>
-              <a:rPr lang="en-US" sz="1200" b="1" dirty="0"/>
+              <a:rPr lang="en-US" sz="1300" b="1" dirty="0"/>
+              <a:t>Feature Selection and Engineering (Version 2):</a:t>
+            </a:r>
+          </a:p>
+          <a:p>
+            <a:pPr marL="628650" lvl="1" indent="-171450">
+              <a:lnSpc>
+                <a:spcPct val="95000"/>
+              </a:lnSpc>
+              <a:spcBef>
+                <a:spcPts val="600"/>
+              </a:spcBef>
+            </a:pPr>
+            <a:r>
+              <a:rPr lang="en-US" sz="1300" b="1" dirty="0"/>
+              <a:t>   </a:t>
+            </a:r>
+            <a:r>
+              <a:rPr lang="en-US" sz="1300" dirty="0"/>
+              <a:t>Used pair plots with Kernel Density Estimate plots off-diagonal and histograms on diagonal for feature selection and engineering.</a:t>
+            </a:r>
+          </a:p>
+          <a:p>
+            <a:pPr marL="457200" lvl="1" indent="0">
+              <a:lnSpc>
+                <a:spcPct val="95000"/>
+              </a:lnSpc>
+              <a:spcBef>
+                <a:spcPts val="600"/>
+              </a:spcBef>
+              <a:buNone/>
+            </a:pPr>
+            <a:endParaRPr lang="en-US" sz="1300" dirty="0"/>
+          </a:p>
+          <a:p>
+            <a:pPr marL="171450" marR="0" lvl="0" indent="-171450" algn="l" defTabSz="914400" rtl="0" eaLnBrk="1" fontAlgn="auto" latinLnBrk="0" hangingPunct="1">
+              <a:lnSpc>
+                <a:spcPct val="95000"/>
+              </a:lnSpc>
+              <a:spcAft>
+                <a:spcPts val="0"/>
+              </a:spcAft>
+              <a:buClr>
+                <a:srgbClr val="CACACA"/>
+              </a:buClr>
+              <a:buSzPts val="1800"/>
+              <a:buFont typeface="Average"/>
+              <a:buChar char="●"/>
+              <a:tabLst/>
+              <a:defRPr/>
+            </a:pPr>
+            <a:r>
+              <a:rPr kumimoji="0" lang="en-US" sz="1300" b="1" i="0" u="none" strike="noStrike" kern="0" cap="none" spc="0" normalizeH="0" baseline="0" noProof="0" dirty="0">
+                <a:ln>
+                  <a:noFill/>
+                </a:ln>
+                <a:solidFill>
+                  <a:srgbClr val="CACACA"/>
+                </a:solidFill>
+                <a:effectLst/>
+                <a:uLnTx/>
+                <a:uFillTx/>
+                <a:latin typeface="Average"/>
+                <a:sym typeface="Average"/>
+              </a:rPr>
+              <a:t>Feature Density Handling (Version 3):</a:t>
+            </a:r>
+          </a:p>
+          <a:p>
+            <a:pPr marL="628650" lvl="1" indent="-171450">
+              <a:lnSpc>
+                <a:spcPct val="95000"/>
+              </a:lnSpc>
+              <a:spcBef>
+                <a:spcPts val="600"/>
+              </a:spcBef>
+            </a:pPr>
+            <a:r>
+              <a:rPr lang="en-US" sz="1300" dirty="0"/>
+              <a:t>   Used violin plots to further understand feature distributions (modality and </a:t>
+            </a:r>
+            <a:r>
+              <a:rPr lang="en-US" sz="1300" dirty="0" err="1"/>
+              <a:t>denisties</a:t>
+            </a:r>
+            <a:r>
+              <a:rPr lang="en-US" sz="1300" dirty="0"/>
+              <a:t>) and identify outliers.</a:t>
+            </a:r>
+          </a:p>
+          <a:p>
+            <a:pPr marL="628650" lvl="1" indent="-171450">
+              <a:lnSpc>
+                <a:spcPct val="95000"/>
+              </a:lnSpc>
+              <a:spcBef>
+                <a:spcPts val="600"/>
+              </a:spcBef>
+            </a:pPr>
+            <a:r>
+              <a:rPr lang="en-US" sz="1300" dirty="0"/>
+              <a:t>   Indicated need for the use of One Hot Encoding.</a:t>
+            </a:r>
+          </a:p>
+          <a:p>
+            <a:pPr marL="0" indent="0">
+              <a:lnSpc>
+                <a:spcPct val="95000"/>
+              </a:lnSpc>
+              <a:spcBef>
+                <a:spcPts val="600"/>
+              </a:spcBef>
+              <a:buNone/>
+            </a:pPr>
+            <a:endParaRPr lang="en-US" sz="1300" dirty="0"/>
+          </a:p>
+          <a:p>
+            <a:pPr marL="171450" indent="-171450">
+              <a:lnSpc>
+                <a:spcPct val="95000"/>
+              </a:lnSpc>
+            </a:pPr>
+            <a:r>
+              <a:rPr lang="en-US" sz="1300" b="1" dirty="0"/>
               <a:t>Feature Scaling (Focus: Consistency &amp; Compatibility):</a:t>
             </a:r>
           </a:p>
@@ -9810,7 +10711,7 @@
               <a:buFont typeface="Average"/>
               <a:buNone/>
             </a:pPr>
-            <a:endParaRPr lang="en-US" sz="1200" dirty="0">
+            <a:endParaRPr lang="en-US" sz="1300" dirty="0">
               <a:solidFill>
                 <a:schemeClr val="dk1"/>
               </a:solidFill>
@@ -9824,7 +10725,7 @@
               </a:lnSpc>
             </a:pPr>
             <a:r>
-              <a:rPr lang="en-US" sz="1200" b="1" dirty="0"/>
+              <a:rPr lang="en-US" sz="1300" b="1" dirty="0"/>
               <a:t>Multicollinearity Reduction (Focus: Model Stability):</a:t>
             </a:r>
           </a:p>
@@ -9860,13 +10761,37 @@
               <a:rPr lang="en-US" sz="1300" dirty="0"/>
               <a:t>Performed an iterative feature removal process based on high VIF scores (Versions 5, onwards).</a:t>
             </a:r>
+          </a:p>
+          <a:p>
+            <a:pPr marL="628650" lvl="1" indent="-171450">
+              <a:lnSpc>
+                <a:spcPct val="95000"/>
+              </a:lnSpc>
+            </a:pPr>
+            <a:endParaRPr lang="en-US" sz="1300" dirty="0"/>
+          </a:p>
+          <a:p>
+            <a:pPr marL="628650" lvl="1" indent="-171450">
+              <a:lnSpc>
+                <a:spcPct val="95000"/>
+              </a:lnSpc>
+            </a:pPr>
+            <a:endParaRPr lang="en-US" sz="1300" dirty="0"/>
+          </a:p>
+          <a:p>
+            <a:pPr marL="628650" lvl="1" indent="-171450">
+              <a:lnSpc>
+                <a:spcPct val="95000"/>
+              </a:lnSpc>
+            </a:pPr>
+            <a:endParaRPr lang="en-US" sz="1300" dirty="0"/>
           </a:p>
         </p:txBody>
       </p:sp>
     </p:spTree>
     <p:extLst>
       <p:ext uri="{BB962C8B-B14F-4D97-AF65-F5344CB8AC3E}">
-        <p14:creationId xmlns:p14="http://schemas.microsoft.com/office/powerpoint/2010/main" val="1829082533"/>
+        <p14:creationId xmlns:p14="http://schemas.microsoft.com/office/powerpoint/2010/main" val="3767570820"/>
       </p:ext>
     </p:extLst>
   </p:cSld>
@@ -10013,6 +10938,267 @@
   <p:cSld>
     <p:spTree>
       <p:nvGrpSpPr>
+        <p:cNvPr id="1" name=""/>
+        <p:cNvGrpSpPr/>
+        <p:nvPr/>
+      </p:nvGrpSpPr>
+      <p:grpSpPr>
+        <a:xfrm>
+          <a:off x="0" y="0"/>
+          <a:ext cx="0" cy="0"/>
+          <a:chOff x="0" y="0"/>
+          <a:chExt cx="0" cy="0"/>
+        </a:xfrm>
+      </p:grpSpPr>
+      <p:sp>
+        <p:nvSpPr>
+          <p:cNvPr id="2" name="Title 1">
+            <a:extLst>
+              <a:ext uri="{FF2B5EF4-FFF2-40B4-BE49-F238E27FC236}">
+                <a16:creationId xmlns:a16="http://schemas.microsoft.com/office/drawing/2014/main" id="{8882FB03-CA7A-249C-B1DA-75EE7F6517F1}"/>
+              </a:ext>
+            </a:extLst>
+          </p:cNvPr>
+          <p:cNvSpPr>
+            <a:spLocks noGrp="1"/>
+          </p:cNvSpPr>
+          <p:nvPr>
+            <p:ph type="title"/>
+          </p:nvPr>
+        </p:nvSpPr>
+        <p:spPr/>
+        <p:txBody>
+          <a:bodyPr/>
+          <a:lstStyle/>
+          <a:p>
+            <a:r>
+              <a:rPr lang="en-US" dirty="0"/>
+              <a:t>Feature Selection and Feature Engineering Using Pair Plots</a:t>
+            </a:r>
+          </a:p>
+        </p:txBody>
+      </p:sp>
+      <p:sp>
+        <p:nvSpPr>
+          <p:cNvPr id="3" name="Text Placeholder 2">
+            <a:extLst>
+              <a:ext uri="{FF2B5EF4-FFF2-40B4-BE49-F238E27FC236}">
+                <a16:creationId xmlns:a16="http://schemas.microsoft.com/office/drawing/2014/main" id="{792BC7C0-A437-B5CE-FB4D-B44D0CA8799A}"/>
+              </a:ext>
+            </a:extLst>
+          </p:cNvPr>
+          <p:cNvSpPr>
+            <a:spLocks noGrp="1"/>
+          </p:cNvSpPr>
+          <p:nvPr>
+            <p:ph type="body" idx="1"/>
+          </p:nvPr>
+        </p:nvSpPr>
+        <p:spPr>
+          <a:xfrm>
+            <a:off x="311700" y="1017726"/>
+            <a:ext cx="8520600" cy="4004848"/>
+          </a:xfrm>
+        </p:spPr>
+        <p:txBody>
+          <a:bodyPr>
+            <a:normAutofit fontScale="70000" lnSpcReduction="20000"/>
+          </a:bodyPr>
+          <a:lstStyle/>
+          <a:p>
+            <a:pPr marL="114300" indent="0">
+              <a:buNone/>
+            </a:pPr>
+            <a:r>
+              <a:rPr lang="en-US" b="1" dirty="0"/>
+              <a:t>Diagonal:</a:t>
+            </a:r>
+          </a:p>
+          <a:p>
+            <a:r>
+              <a:rPr lang="en-US" b="1" dirty="0"/>
+              <a:t>BMI: </a:t>
+            </a:r>
+            <a:r>
+              <a:rPr lang="en-US" dirty="0"/>
+              <a:t>Shows a right-skewed distribution indicating higher BMI values are more common in diabetic individuals. There's a clear visual separation.</a:t>
+            </a:r>
+          </a:p>
+          <a:p>
+            <a:r>
+              <a:rPr lang="en-US" b="1" dirty="0"/>
+              <a:t>Age: </a:t>
+            </a:r>
+            <a:r>
+              <a:rPr lang="en-US" dirty="0"/>
+              <a:t>Also shows a right-skewed distribution the separation isn't as pronounced as BMI, but shows distinct age groups.</a:t>
+            </a:r>
+          </a:p>
+          <a:p>
+            <a:r>
+              <a:rPr lang="en-US" b="1" dirty="0" err="1"/>
+              <a:t>GenHlth</a:t>
+            </a:r>
+            <a:r>
+              <a:rPr lang="en-US" b="1" dirty="0"/>
+              <a:t>: </a:t>
+            </a:r>
+            <a:r>
+              <a:rPr lang="en-US" dirty="0"/>
+              <a:t>The non-diabetic group is heavily concentrated in the "Excellent" and "Very Good" categories (lower numerical values), while the diabetic group has a much higher proportion in "Fair" and "Poor" categories (higher numerical values). This feature shows strong discriminatory power.</a:t>
+            </a:r>
+          </a:p>
+          <a:p>
+            <a:r>
+              <a:rPr lang="en-US" b="1" dirty="0"/>
+              <a:t>Income: </a:t>
+            </a:r>
+            <a:r>
+              <a:rPr lang="en-US" dirty="0"/>
+              <a:t>Similar to </a:t>
+            </a:r>
+            <a:r>
+              <a:rPr lang="en-US" dirty="0" err="1"/>
+              <a:t>GenHlth</a:t>
+            </a:r>
+            <a:r>
+              <a:rPr lang="en-US" dirty="0"/>
+              <a:t>, Non-diabetic individuals are more prevalent in higher income brackets, and diabetic individuals are more represented in lower income brackets. This feature also seems informative.</a:t>
+            </a:r>
+          </a:p>
+          <a:p>
+            <a:r>
+              <a:rPr lang="en-US" b="1" dirty="0" err="1"/>
+              <a:t>HighBP</a:t>
+            </a:r>
+            <a:r>
+              <a:rPr lang="en-US" b="1" dirty="0"/>
+              <a:t>: </a:t>
+            </a:r>
+            <a:r>
+              <a:rPr lang="en-US" dirty="0"/>
+              <a:t>Non-diabetic group is heavily skewed towards </a:t>
+            </a:r>
+            <a:r>
+              <a:rPr lang="en-US" dirty="0" err="1"/>
+              <a:t>HighBP</a:t>
+            </a:r>
+            <a:r>
+              <a:rPr lang="en-US" dirty="0"/>
+              <a:t>=0 (no high blood pressure), while the diabetic group has a significant proportion with </a:t>
+            </a:r>
+            <a:r>
+              <a:rPr lang="en-US" dirty="0" err="1"/>
+              <a:t>HighBP</a:t>
+            </a:r>
+            <a:r>
+              <a:rPr lang="en-US" dirty="0"/>
+              <a:t>=1 (high blood pressure). This is a strong indicator.</a:t>
+            </a:r>
+          </a:p>
+          <a:p>
+            <a:pPr marL="114300" indent="0">
+              <a:buNone/>
+            </a:pPr>
+            <a:r>
+              <a:rPr lang="en-US" b="1" dirty="0"/>
+              <a:t>Off-Diagonal:</a:t>
+            </a:r>
+          </a:p>
+          <a:p>
+            <a:r>
+              <a:rPr lang="en-US" b="1" dirty="0"/>
+              <a:t>BMI vs. Age: </a:t>
+            </a:r>
+            <a:r>
+              <a:rPr lang="en-US" dirty="0"/>
+              <a:t>The KDE plot shows that the highest density for non-diabetic individuals is at lower BMI and younger ages (bottom left), indicating that the combination of higher BMI and older age significantly increases diabetes likelihood.</a:t>
+            </a:r>
+          </a:p>
+          <a:p>
+            <a:r>
+              <a:rPr lang="en-US" b="1" dirty="0"/>
+              <a:t>BMI vs. </a:t>
+            </a:r>
+            <a:r>
+              <a:rPr lang="en-US" b="1" dirty="0" err="1"/>
+              <a:t>GenHlth</a:t>
+            </a:r>
+            <a:r>
+              <a:rPr lang="en-US" b="1" dirty="0"/>
+              <a:t>: </a:t>
+            </a:r>
+            <a:r>
+              <a:rPr lang="en-US" dirty="0"/>
+              <a:t>Non-diabetic individuals are concentrated at lower BMI and better general health (lower </a:t>
+            </a:r>
+            <a:r>
+              <a:rPr lang="en-US" dirty="0" err="1"/>
+              <a:t>GenHlth</a:t>
+            </a:r>
+            <a:r>
+              <a:rPr lang="en-US" dirty="0"/>
+              <a:t> numerical values), confirming the combined influence of these factors.</a:t>
+            </a:r>
+          </a:p>
+          <a:p>
+            <a:r>
+              <a:rPr lang="en-US" b="1" dirty="0" err="1"/>
+              <a:t>GenHlth</a:t>
+            </a:r>
+            <a:r>
+              <a:rPr lang="en-US" b="1" dirty="0"/>
+              <a:t> vs. </a:t>
+            </a:r>
+            <a:r>
+              <a:rPr lang="en-US" b="1" dirty="0" err="1"/>
+              <a:t>HighBP</a:t>
+            </a:r>
+            <a:r>
+              <a:rPr lang="en-US" b="1" dirty="0"/>
+              <a:t>: </a:t>
+            </a:r>
+            <a:r>
+              <a:rPr lang="en-US" dirty="0"/>
+              <a:t>Strong separation. Excellent/Very Good health is strongly associated with no </a:t>
+            </a:r>
+            <a:r>
+              <a:rPr lang="en-US" dirty="0" err="1"/>
+              <a:t>HighBP</a:t>
+            </a:r>
+            <a:r>
+              <a:rPr lang="en-US" dirty="0"/>
+              <a:t>, while Fair/Poor health is strongly associated with </a:t>
+            </a:r>
+            <a:r>
+              <a:rPr lang="en-US" dirty="0" err="1"/>
+              <a:t>HighBP</a:t>
+            </a:r>
+            <a:r>
+              <a:rPr lang="en-US" dirty="0"/>
+              <a:t>, especially for the diabetic group.</a:t>
+            </a:r>
+          </a:p>
+        </p:txBody>
+      </p:sp>
+    </p:spTree>
+    <p:extLst>
+      <p:ext uri="{BB962C8B-B14F-4D97-AF65-F5344CB8AC3E}">
+        <p14:creationId xmlns:p14="http://schemas.microsoft.com/office/powerpoint/2010/main" val="1284772218"/>
+      </p:ext>
+    </p:extLst>
+  </p:cSld>
+  <p:clrMapOvr>
+    <a:masterClrMapping/>
+  </p:clrMapOvr>
+</p:sld>
+</file>
+
+<file path=ppt/slides/slide9.xml><?xml version="1.0" encoding="utf-8"?>
+<p:sld xmlns:a="http://schemas.openxmlformats.org/drawingml/2006/main" xmlns:r="http://schemas.openxmlformats.org/officeDocument/2006/relationships" xmlns:p="http://schemas.openxmlformats.org/presentationml/2006/main">
+  <p:cSld>
+    <p:spTree>
+      <p:nvGrpSpPr>
         <p:cNvPr id="1" name="Shape 76"/>
         <p:cNvGrpSpPr/>
         <p:nvPr/>
@@ -10613,777 +11799,6 @@
                 <a:sym typeface="Oswald"/>
               </a:rPr>
               <a:t> didn't significantly boost the metrics for Logistic Regression. This suggests that further optimization of the Logistic Regression model itself might be limited, and the issue might lie elsewhere.</a:t>
-            </a:r>
-          </a:p>
-          <a:p>
-            <a:endParaRPr lang="en-US" sz="1200" dirty="0">
-              <a:solidFill>
-                <a:schemeClr val="dk1"/>
-              </a:solidFill>
-              <a:latin typeface="Oswald"/>
-              <a:ea typeface="Oswald"/>
-              <a:cs typeface="Oswald"/>
-              <a:sym typeface="Oswald"/>
-            </a:endParaRPr>
-          </a:p>
-          <a:p>
-            <a:endParaRPr lang="en-US" sz="1200" dirty="0">
-              <a:solidFill>
-                <a:schemeClr val="dk1"/>
-              </a:solidFill>
-              <a:latin typeface="Oswald"/>
-              <a:ea typeface="Oswald"/>
-              <a:cs typeface="Oswald"/>
-              <a:sym typeface="Oswald"/>
-            </a:endParaRPr>
-          </a:p>
-        </p:txBody>
-      </p:sp>
-    </p:spTree>
-  </p:cSld>
-  <p:clrMapOvr>
-    <a:masterClrMapping/>
-  </p:clrMapOvr>
-</p:sld>
-</file>
-
-<file path=ppt/slides/slide9.xml><?xml version="1.0" encoding="utf-8"?>
-<p:sld xmlns:a="http://schemas.openxmlformats.org/drawingml/2006/main" xmlns:r="http://schemas.openxmlformats.org/officeDocument/2006/relationships" xmlns:p="http://schemas.openxmlformats.org/presentationml/2006/main">
-  <p:cSld>
-    <p:spTree>
-      <p:nvGrpSpPr>
-        <p:cNvPr id="1" name="Shape 82"/>
-        <p:cNvGrpSpPr/>
-        <p:nvPr/>
-      </p:nvGrpSpPr>
-      <p:grpSpPr>
-        <a:xfrm>
-          <a:off x="0" y="0"/>
-          <a:ext cx="0" cy="0"/>
-          <a:chOff x="0" y="0"/>
-          <a:chExt cx="0" cy="0"/>
-        </a:xfrm>
-      </p:grpSpPr>
-      <p:sp>
-        <p:nvSpPr>
-          <p:cNvPr id="83" name="Google Shape;83;p17"/>
-          <p:cNvSpPr txBox="1">
-            <a:spLocks noGrp="1"/>
-          </p:cNvSpPr>
-          <p:nvPr>
-            <p:ph type="title"/>
-          </p:nvPr>
-        </p:nvSpPr>
-        <p:spPr>
-          <a:xfrm>
-            <a:off x="265974" y="193575"/>
-            <a:ext cx="3868703" cy="572700"/>
-          </a:xfrm>
-          <a:prstGeom prst="rect">
-            <a:avLst/>
-          </a:prstGeom>
-        </p:spPr>
-        <p:txBody>
-          <a:bodyPr spcFirstLastPara="1" wrap="square" lIns="91425" tIns="91425" rIns="91425" bIns="91425" anchor="t" anchorCtr="0">
-            <a:noAutofit/>
-          </a:bodyPr>
-          <a:lstStyle/>
-          <a:p>
-            <a:pPr marL="0" lvl="0" indent="0" algn="l" rtl="0">
-              <a:spcBef>
-                <a:spcPts val="0"/>
-              </a:spcBef>
-              <a:spcAft>
-                <a:spcPts val="0"/>
-              </a:spcAft>
-              <a:buNone/>
-            </a:pPr>
-            <a:r>
-              <a:rPr lang="en" sz="2600" dirty="0"/>
-              <a:t>Random Forest </a:t>
-            </a:r>
-            <a:r>
-              <a:rPr lang="en-US" sz="2600" dirty="0"/>
-              <a:t>(Version 10): </a:t>
-            </a:r>
-            <a:r>
-              <a:rPr lang="en" sz="2600" dirty="0"/>
-              <a:t>  </a:t>
-            </a:r>
-            <a:endParaRPr sz="2600" dirty="0"/>
-          </a:p>
-        </p:txBody>
-      </p:sp>
-      <p:sp>
-        <p:nvSpPr>
-          <p:cNvPr id="84" name="Google Shape;84;p17"/>
-          <p:cNvSpPr/>
-          <p:nvPr/>
-        </p:nvSpPr>
-        <p:spPr>
-          <a:xfrm>
-            <a:off x="139325" y="159825"/>
-            <a:ext cx="3723684" cy="640200"/>
-          </a:xfrm>
-          <a:prstGeom prst="rect">
-            <a:avLst/>
-          </a:prstGeom>
-          <a:noFill/>
-          <a:ln w="9525" cap="flat" cmpd="sng">
-            <a:solidFill>
-              <a:schemeClr val="dk2"/>
-            </a:solidFill>
-            <a:prstDash val="solid"/>
-            <a:round/>
-            <a:headEnd type="none" w="sm" len="sm"/>
-            <a:tailEnd type="none" w="sm" len="sm"/>
-          </a:ln>
-        </p:spPr>
-        <p:txBody>
-          <a:bodyPr spcFirstLastPara="1" wrap="square" lIns="91425" tIns="91425" rIns="91425" bIns="91425" anchor="ctr" anchorCtr="0">
-            <a:noAutofit/>
-          </a:bodyPr>
-          <a:lstStyle/>
-          <a:p>
-            <a:pPr marL="0" lvl="0" indent="0" algn="ctr" rtl="0">
-              <a:spcBef>
-                <a:spcPts val="0"/>
-              </a:spcBef>
-              <a:spcAft>
-                <a:spcPts val="0"/>
-              </a:spcAft>
-              <a:buNone/>
-            </a:pPr>
-            <a:endParaRPr>
-              <a:latin typeface="Average"/>
-              <a:ea typeface="Average"/>
-              <a:cs typeface="Average"/>
-              <a:sym typeface="Average"/>
-            </a:endParaRPr>
-          </a:p>
-        </p:txBody>
-      </p:sp>
-      <p:sp>
-        <p:nvSpPr>
-          <p:cNvPr id="2" name="Google Shape;72;p15">
-            <a:extLst>
-              <a:ext uri="{FF2B5EF4-FFF2-40B4-BE49-F238E27FC236}">
-                <a16:creationId xmlns:a16="http://schemas.microsoft.com/office/drawing/2014/main" id="{0348BC04-2120-1BBF-2675-25C9BC032DD6}"/>
-              </a:ext>
-            </a:extLst>
-          </p:cNvPr>
-          <p:cNvSpPr txBox="1">
-            <a:spLocks/>
-          </p:cNvSpPr>
-          <p:nvPr/>
-        </p:nvSpPr>
-        <p:spPr>
-          <a:xfrm>
-            <a:off x="311700" y="1152474"/>
-            <a:ext cx="8520600" cy="3889977"/>
-          </a:xfrm>
-          <a:prstGeom prst="rect">
-            <a:avLst/>
-          </a:prstGeom>
-        </p:spPr>
-        <p:txBody>
-          <a:bodyPr spcFirstLastPara="1" wrap="square" lIns="91425" tIns="91425" rIns="91425" bIns="91425" anchor="t" anchorCtr="0">
-            <a:noAutofit/>
-          </a:bodyPr>
-          <a:lstStyle>
-            <a:defPPr marR="0" lvl="0" algn="l" rtl="0">
-              <a:lnSpc>
-                <a:spcPct val="100000"/>
-              </a:lnSpc>
-              <a:spcBef>
-                <a:spcPts val="0"/>
-              </a:spcBef>
-              <a:spcAft>
-                <a:spcPts val="0"/>
-              </a:spcAft>
-            </a:defPPr>
-            <a:lvl1pPr marR="0" lvl="0" algn="l" rtl="0">
-              <a:lnSpc>
-                <a:spcPct val="100000"/>
-              </a:lnSpc>
-              <a:spcBef>
-                <a:spcPts val="0"/>
-              </a:spcBef>
-              <a:spcAft>
-                <a:spcPts val="0"/>
-              </a:spcAft>
-              <a:buClr>
-                <a:srgbClr val="000000"/>
-              </a:buClr>
-              <a:buFont typeface="Arial"/>
-              <a:defRPr sz="1400" b="0" i="0" u="none" strike="noStrike" cap="none">
-                <a:solidFill>
-                  <a:srgbClr val="000000"/>
-                </a:solidFill>
-                <a:latin typeface="Arial"/>
-                <a:ea typeface="Arial"/>
-                <a:cs typeface="Arial"/>
-                <a:sym typeface="Arial"/>
-              </a:defRPr>
-            </a:lvl1pPr>
-            <a:lvl2pPr marR="0" lvl="1" algn="l" rtl="0">
-              <a:lnSpc>
-                <a:spcPct val="100000"/>
-              </a:lnSpc>
-              <a:spcBef>
-                <a:spcPts val="0"/>
-              </a:spcBef>
-              <a:spcAft>
-                <a:spcPts val="0"/>
-              </a:spcAft>
-              <a:buClr>
-                <a:srgbClr val="000000"/>
-              </a:buClr>
-              <a:buFont typeface="Arial"/>
-              <a:defRPr sz="1400" b="0" i="0" u="none" strike="noStrike" cap="none">
-                <a:solidFill>
-                  <a:srgbClr val="000000"/>
-                </a:solidFill>
-                <a:latin typeface="Arial"/>
-                <a:ea typeface="Arial"/>
-                <a:cs typeface="Arial"/>
-                <a:sym typeface="Arial"/>
-              </a:defRPr>
-            </a:lvl2pPr>
-            <a:lvl3pPr marR="0" lvl="2" algn="l" rtl="0">
-              <a:lnSpc>
-                <a:spcPct val="100000"/>
-              </a:lnSpc>
-              <a:spcBef>
-                <a:spcPts val="0"/>
-              </a:spcBef>
-              <a:spcAft>
-                <a:spcPts val="0"/>
-              </a:spcAft>
-              <a:buClr>
-                <a:srgbClr val="000000"/>
-              </a:buClr>
-              <a:buFont typeface="Arial"/>
-              <a:defRPr sz="1400" b="0" i="0" u="none" strike="noStrike" cap="none">
-                <a:solidFill>
-                  <a:srgbClr val="000000"/>
-                </a:solidFill>
-                <a:latin typeface="Arial"/>
-                <a:ea typeface="Arial"/>
-                <a:cs typeface="Arial"/>
-                <a:sym typeface="Arial"/>
-              </a:defRPr>
-            </a:lvl3pPr>
-            <a:lvl4pPr marR="0" lvl="3" algn="l" rtl="0">
-              <a:lnSpc>
-                <a:spcPct val="100000"/>
-              </a:lnSpc>
-              <a:spcBef>
-                <a:spcPts val="0"/>
-              </a:spcBef>
-              <a:spcAft>
-                <a:spcPts val="0"/>
-              </a:spcAft>
-              <a:buClr>
-                <a:srgbClr val="000000"/>
-              </a:buClr>
-              <a:buFont typeface="Arial"/>
-              <a:defRPr sz="1400" b="0" i="0" u="none" strike="noStrike" cap="none">
-                <a:solidFill>
-                  <a:srgbClr val="000000"/>
-                </a:solidFill>
-                <a:latin typeface="Arial"/>
-                <a:ea typeface="Arial"/>
-                <a:cs typeface="Arial"/>
-                <a:sym typeface="Arial"/>
-              </a:defRPr>
-            </a:lvl4pPr>
-            <a:lvl5pPr marR="0" lvl="4" algn="l" rtl="0">
-              <a:lnSpc>
-                <a:spcPct val="100000"/>
-              </a:lnSpc>
-              <a:spcBef>
-                <a:spcPts val="0"/>
-              </a:spcBef>
-              <a:spcAft>
-                <a:spcPts val="0"/>
-              </a:spcAft>
-              <a:buClr>
-                <a:srgbClr val="000000"/>
-              </a:buClr>
-              <a:buFont typeface="Arial"/>
-              <a:defRPr sz="1400" b="0" i="0" u="none" strike="noStrike" cap="none">
-                <a:solidFill>
-                  <a:srgbClr val="000000"/>
-                </a:solidFill>
-                <a:latin typeface="Arial"/>
-                <a:ea typeface="Arial"/>
-                <a:cs typeface="Arial"/>
-                <a:sym typeface="Arial"/>
-              </a:defRPr>
-            </a:lvl5pPr>
-            <a:lvl6pPr marR="0" lvl="5" algn="l" rtl="0">
-              <a:lnSpc>
-                <a:spcPct val="100000"/>
-              </a:lnSpc>
-              <a:spcBef>
-                <a:spcPts val="0"/>
-              </a:spcBef>
-              <a:spcAft>
-                <a:spcPts val="0"/>
-              </a:spcAft>
-              <a:buClr>
-                <a:srgbClr val="000000"/>
-              </a:buClr>
-              <a:buFont typeface="Arial"/>
-              <a:defRPr sz="1400" b="0" i="0" u="none" strike="noStrike" cap="none">
-                <a:solidFill>
-                  <a:srgbClr val="000000"/>
-                </a:solidFill>
-                <a:latin typeface="Arial"/>
-                <a:ea typeface="Arial"/>
-                <a:cs typeface="Arial"/>
-                <a:sym typeface="Arial"/>
-              </a:defRPr>
-            </a:lvl6pPr>
-            <a:lvl7pPr marR="0" lvl="6" algn="l" rtl="0">
-              <a:lnSpc>
-                <a:spcPct val="100000"/>
-              </a:lnSpc>
-              <a:spcBef>
-                <a:spcPts val="0"/>
-              </a:spcBef>
-              <a:spcAft>
-                <a:spcPts val="0"/>
-              </a:spcAft>
-              <a:buClr>
-                <a:srgbClr val="000000"/>
-              </a:buClr>
-              <a:buFont typeface="Arial"/>
-              <a:defRPr sz="1400" b="0" i="0" u="none" strike="noStrike" cap="none">
-                <a:solidFill>
-                  <a:srgbClr val="000000"/>
-                </a:solidFill>
-                <a:latin typeface="Arial"/>
-                <a:ea typeface="Arial"/>
-                <a:cs typeface="Arial"/>
-                <a:sym typeface="Arial"/>
-              </a:defRPr>
-            </a:lvl7pPr>
-            <a:lvl8pPr marR="0" lvl="7" algn="l" rtl="0">
-              <a:lnSpc>
-                <a:spcPct val="100000"/>
-              </a:lnSpc>
-              <a:spcBef>
-                <a:spcPts val="0"/>
-              </a:spcBef>
-              <a:spcAft>
-                <a:spcPts val="0"/>
-              </a:spcAft>
-              <a:buClr>
-                <a:srgbClr val="000000"/>
-              </a:buClr>
-              <a:buFont typeface="Arial"/>
-              <a:defRPr sz="1400" b="0" i="0" u="none" strike="noStrike" cap="none">
-                <a:solidFill>
-                  <a:srgbClr val="000000"/>
-                </a:solidFill>
-                <a:latin typeface="Arial"/>
-                <a:ea typeface="Arial"/>
-                <a:cs typeface="Arial"/>
-                <a:sym typeface="Arial"/>
-              </a:defRPr>
-            </a:lvl8pPr>
-            <a:lvl9pPr marR="0" lvl="8" algn="l" rtl="0">
-              <a:lnSpc>
-                <a:spcPct val="100000"/>
-              </a:lnSpc>
-              <a:spcBef>
-                <a:spcPts val="0"/>
-              </a:spcBef>
-              <a:spcAft>
-                <a:spcPts val="0"/>
-              </a:spcAft>
-              <a:buClr>
-                <a:srgbClr val="000000"/>
-              </a:buClr>
-              <a:buFont typeface="Arial"/>
-              <a:defRPr sz="1400" b="0" i="0" u="none" strike="noStrike" cap="none">
-                <a:solidFill>
-                  <a:srgbClr val="000000"/>
-                </a:solidFill>
-                <a:latin typeface="Arial"/>
-                <a:ea typeface="Arial"/>
-                <a:cs typeface="Arial"/>
-                <a:sym typeface="Arial"/>
-              </a:defRPr>
-            </a:lvl9pPr>
-          </a:lstStyle>
-          <a:p>
-            <a:pPr>
-              <a:lnSpc>
-                <a:spcPct val="95000"/>
-              </a:lnSpc>
-              <a:buClr>
-                <a:schemeClr val="accent3"/>
-              </a:buClr>
-              <a:buSzPts val="1800"/>
-            </a:pPr>
-            <a:r>
-              <a:rPr lang="en-US" sz="1200" dirty="0">
-                <a:solidFill>
-                  <a:schemeClr val="accent3"/>
-                </a:solidFill>
-                <a:latin typeface="Average"/>
-                <a:sym typeface="Oswald"/>
-              </a:rPr>
-              <a:t>The Random Forest model was introduced to capture non-linearities. Optimization using </a:t>
-            </a:r>
-            <a:r>
-              <a:rPr lang="en-US" sz="1200" dirty="0" err="1">
-                <a:solidFill>
-                  <a:schemeClr val="accent3"/>
-                </a:solidFill>
-                <a:latin typeface="Average"/>
-                <a:sym typeface="Oswald"/>
-              </a:rPr>
-              <a:t>RandomizedSearchCV</a:t>
-            </a:r>
-            <a:r>
-              <a:rPr lang="en-US" sz="1200" dirty="0">
-                <a:solidFill>
-                  <a:schemeClr val="accent3"/>
-                </a:solidFill>
-                <a:latin typeface="Average"/>
-                <a:sym typeface="Oswald"/>
-              </a:rPr>
-              <a:t> (balancing thoroughness and efficiency) provided improved performance over the baseline Logistic Regression (AUC-ROC ~0.803), demonstrating the value of tree-based ensembles.</a:t>
-            </a:r>
-          </a:p>
-          <a:p>
-            <a:pPr>
-              <a:lnSpc>
-                <a:spcPct val="95000"/>
-              </a:lnSpc>
-              <a:buClr>
-                <a:schemeClr val="accent3"/>
-              </a:buClr>
-              <a:buSzPts val="1800"/>
-            </a:pPr>
-            <a:endParaRPr lang="en-US" sz="1200" dirty="0">
-              <a:solidFill>
-                <a:schemeClr val="accent3"/>
-              </a:solidFill>
-              <a:latin typeface="Average"/>
-              <a:sym typeface="Oswald"/>
-            </a:endParaRPr>
-          </a:p>
-          <a:p>
-            <a:pPr>
-              <a:lnSpc>
-                <a:spcPct val="95000"/>
-              </a:lnSpc>
-              <a:buClr>
-                <a:schemeClr val="accent3"/>
-              </a:buClr>
-              <a:buSzPts val="1800"/>
-            </a:pPr>
-            <a:r>
-              <a:rPr lang="en-US" sz="1200" dirty="0">
-                <a:solidFill>
-                  <a:schemeClr val="accent3"/>
-                </a:solidFill>
-                <a:latin typeface="Average"/>
-                <a:sym typeface="Oswald"/>
-              </a:rPr>
-              <a:t>Efficient Random Forest Optimization: The core change is using </a:t>
-            </a:r>
-            <a:r>
-              <a:rPr lang="en-US" sz="1200" dirty="0" err="1">
-                <a:solidFill>
-                  <a:schemeClr val="accent3"/>
-                </a:solidFill>
-                <a:latin typeface="Average"/>
-                <a:sym typeface="Oswald"/>
-              </a:rPr>
-              <a:t>RandomizedSearchCV</a:t>
-            </a:r>
-            <a:r>
-              <a:rPr lang="en-US" sz="1200" dirty="0">
-                <a:solidFill>
-                  <a:schemeClr val="accent3"/>
-                </a:solidFill>
-                <a:latin typeface="Average"/>
-                <a:sym typeface="Oswald"/>
-              </a:rPr>
-              <a:t> instead of </a:t>
-            </a:r>
-            <a:r>
-              <a:rPr lang="en-US" sz="1200" dirty="0" err="1">
-                <a:solidFill>
-                  <a:schemeClr val="accent3"/>
-                </a:solidFill>
-                <a:latin typeface="Average"/>
-                <a:sym typeface="Oswald"/>
-              </a:rPr>
-              <a:t>GridSearchCV</a:t>
-            </a:r>
-            <a:r>
-              <a:rPr lang="en-US" sz="1200" dirty="0">
-                <a:solidFill>
-                  <a:schemeClr val="accent3"/>
-                </a:solidFill>
-                <a:latin typeface="Average"/>
-                <a:sym typeface="Oswald"/>
-              </a:rPr>
-              <a:t> for the Random Forest.  Instead of trying every combination of hyperparameters (like </a:t>
-            </a:r>
-            <a:r>
-              <a:rPr lang="en-US" sz="1200" dirty="0" err="1">
-                <a:solidFill>
-                  <a:schemeClr val="accent3"/>
-                </a:solidFill>
-                <a:latin typeface="Average"/>
-                <a:sym typeface="Oswald"/>
-              </a:rPr>
-              <a:t>GridSearchCV</a:t>
-            </a:r>
-            <a:r>
-              <a:rPr lang="en-US" sz="1200" dirty="0">
-                <a:solidFill>
-                  <a:schemeClr val="accent3"/>
-                </a:solidFill>
-                <a:latin typeface="Average"/>
-                <a:sym typeface="Oswald"/>
-              </a:rPr>
-              <a:t>), </a:t>
-            </a:r>
-            <a:r>
-              <a:rPr lang="en-US" sz="1200" dirty="0" err="1">
-                <a:solidFill>
-                  <a:schemeClr val="accent3"/>
-                </a:solidFill>
-                <a:latin typeface="Average"/>
-                <a:sym typeface="Oswald"/>
-              </a:rPr>
-              <a:t>RandomizedSearchCV</a:t>
-            </a:r>
-            <a:r>
-              <a:rPr lang="en-US" sz="1200" dirty="0">
-                <a:solidFill>
-                  <a:schemeClr val="accent3"/>
-                </a:solidFill>
-                <a:latin typeface="Average"/>
-                <a:sym typeface="Oswald"/>
-              </a:rPr>
-              <a:t> samples a specified number of combinations (</a:t>
-            </a:r>
-            <a:r>
-              <a:rPr lang="en-US" sz="1200" dirty="0" err="1">
-                <a:solidFill>
-                  <a:schemeClr val="accent3"/>
-                </a:solidFill>
-                <a:latin typeface="Average"/>
-                <a:sym typeface="Oswald"/>
-              </a:rPr>
-              <a:t>n_iter</a:t>
-            </a:r>
-            <a:r>
-              <a:rPr lang="en-US" sz="1200" dirty="0">
-                <a:solidFill>
-                  <a:schemeClr val="accent3"/>
-                </a:solidFill>
-                <a:latin typeface="Average"/>
-                <a:sym typeface="Oswald"/>
-              </a:rPr>
-              <a:t>) randomly from the provided distributions. This is much faster, especially with large search spaces.</a:t>
-            </a:r>
-          </a:p>
-          <a:p>
-            <a:pPr>
-              <a:lnSpc>
-                <a:spcPct val="95000"/>
-              </a:lnSpc>
-              <a:buClr>
-                <a:schemeClr val="accent3"/>
-              </a:buClr>
-              <a:buSzPts val="1800"/>
-            </a:pPr>
-            <a:endParaRPr lang="en-US" sz="1200" dirty="0">
-              <a:solidFill>
-                <a:schemeClr val="accent3"/>
-              </a:solidFill>
-              <a:latin typeface="Average"/>
-              <a:sym typeface="Oswald"/>
-            </a:endParaRPr>
-          </a:p>
-          <a:p>
-            <a:pPr marL="171450" lvl="5" indent="-171450">
-              <a:lnSpc>
-                <a:spcPct val="95000"/>
-              </a:lnSpc>
-              <a:buClr>
-                <a:schemeClr val="accent3"/>
-              </a:buClr>
-              <a:buSzPts val="1800"/>
-              <a:buFont typeface="Arial"/>
-              <a:buChar char="●"/>
-            </a:pPr>
-            <a:r>
-              <a:rPr lang="en-US" sz="1200" dirty="0">
-                <a:solidFill>
-                  <a:schemeClr val="accent3"/>
-                </a:solidFill>
-                <a:latin typeface="Average"/>
-                <a:sym typeface="Oswald"/>
-              </a:rPr>
-              <a:t>Balanced </a:t>
-            </a:r>
-            <a:r>
-              <a:rPr lang="en-US" sz="1200" dirty="0" err="1">
-                <a:solidFill>
-                  <a:schemeClr val="accent3"/>
-                </a:solidFill>
-                <a:latin typeface="Average"/>
-                <a:sym typeface="Oswald"/>
-              </a:rPr>
-              <a:t>n_iter</a:t>
-            </a:r>
-            <a:r>
-              <a:rPr lang="en-US" sz="1200" dirty="0">
-                <a:solidFill>
-                  <a:schemeClr val="accent3"/>
-                </a:solidFill>
-                <a:latin typeface="Average"/>
-                <a:sym typeface="Oswald"/>
-              </a:rPr>
-              <a:t>: The </a:t>
-            </a:r>
-            <a:r>
-              <a:rPr lang="en-US" sz="1200" dirty="0" err="1">
-                <a:solidFill>
-                  <a:schemeClr val="accent3"/>
-                </a:solidFill>
-                <a:latin typeface="Average"/>
-                <a:sym typeface="Oswald"/>
-              </a:rPr>
-              <a:t>n_iter</a:t>
-            </a:r>
-            <a:r>
-              <a:rPr lang="en-US" sz="1200" dirty="0">
-                <a:solidFill>
-                  <a:schemeClr val="accent3"/>
-                </a:solidFill>
-                <a:latin typeface="Average"/>
-                <a:sym typeface="Oswald"/>
-              </a:rPr>
-              <a:t> parameter is the primary control over the trade-off between search thoroughness and computation time. 20 iterations is a good starting point; you can adjust it based on your available time and the specific problem.</a:t>
-            </a:r>
-          </a:p>
-          <a:p>
-            <a:pPr marL="171450" lvl="5" indent="-171450">
-              <a:lnSpc>
-                <a:spcPct val="95000"/>
-              </a:lnSpc>
-              <a:buClr>
-                <a:schemeClr val="accent3"/>
-              </a:buClr>
-              <a:buSzPts val="1800"/>
-              <a:buFont typeface="Arial"/>
-              <a:buChar char="●"/>
-            </a:pPr>
-            <a:endParaRPr lang="en-US" sz="1200" dirty="0">
-              <a:solidFill>
-                <a:schemeClr val="accent3"/>
-              </a:solidFill>
-              <a:latin typeface="Average"/>
-              <a:sym typeface="Oswald"/>
-            </a:endParaRPr>
-          </a:p>
-          <a:p>
-            <a:pPr marL="171450" lvl="4" indent="-171450">
-              <a:lnSpc>
-                <a:spcPct val="95000"/>
-              </a:lnSpc>
-              <a:buClr>
-                <a:schemeClr val="accent3"/>
-              </a:buClr>
-              <a:buSzPts val="1800"/>
-              <a:buFont typeface="Arial"/>
-              <a:buChar char="●"/>
-            </a:pPr>
-            <a:r>
-              <a:rPr lang="en-US" sz="1200" dirty="0">
-                <a:solidFill>
-                  <a:schemeClr val="accent3"/>
-                </a:solidFill>
-                <a:latin typeface="Average"/>
-                <a:sym typeface="Oswald"/>
-              </a:rPr>
-              <a:t>Strategic Parameter Grid: Even with randomized search, a well-chosen </a:t>
-            </a:r>
-            <a:r>
-              <a:rPr lang="en-US" sz="1200" dirty="0" err="1">
-                <a:solidFill>
-                  <a:schemeClr val="accent3"/>
-                </a:solidFill>
-                <a:latin typeface="Average"/>
-                <a:sym typeface="Oswald"/>
-              </a:rPr>
-              <a:t>param_grid_rf</a:t>
-            </a:r>
-            <a:r>
-              <a:rPr lang="en-US" sz="1200" dirty="0">
-                <a:solidFill>
-                  <a:schemeClr val="accent3"/>
-                </a:solidFill>
-                <a:latin typeface="Average"/>
-                <a:sym typeface="Oswald"/>
-              </a:rPr>
-              <a:t> is important. The ranges provided cover the most important hyperparameters and typical values that work well.</a:t>
-            </a:r>
-          </a:p>
-          <a:p>
-            <a:pPr marL="171450" lvl="4" indent="-171450">
-              <a:lnSpc>
-                <a:spcPct val="95000"/>
-              </a:lnSpc>
-              <a:buClr>
-                <a:schemeClr val="accent3"/>
-              </a:buClr>
-              <a:buSzPts val="1800"/>
-              <a:buFont typeface="Arial"/>
-              <a:buChar char="●"/>
-            </a:pPr>
-            <a:endParaRPr lang="en-US" sz="1200" dirty="0">
-              <a:solidFill>
-                <a:schemeClr val="accent3"/>
-              </a:solidFill>
-              <a:latin typeface="Average"/>
-              <a:sym typeface="Oswald"/>
-            </a:endParaRPr>
-          </a:p>
-          <a:p>
-            <a:pPr marL="171450" lvl="4" indent="-171450">
-              <a:lnSpc>
-                <a:spcPct val="95000"/>
-              </a:lnSpc>
-              <a:buClr>
-                <a:schemeClr val="accent3"/>
-              </a:buClr>
-              <a:buSzPts val="1800"/>
-              <a:buFont typeface="Arial"/>
-              <a:buChar char="●"/>
-            </a:pPr>
-            <a:r>
-              <a:rPr lang="en-US" sz="1200" dirty="0">
-                <a:solidFill>
-                  <a:schemeClr val="accent3"/>
-                </a:solidFill>
-                <a:latin typeface="Average"/>
-                <a:sym typeface="Oswald"/>
-              </a:rPr>
-              <a:t>Reduced CV Folds: Using cv=5 for the Random Forest further speeds up the process without sacrificing too much accuracy in the performance estimate.</a:t>
             </a:r>
           </a:p>
           <a:p>

</xml_diff>